<commit_message>
docs: develop with flutter presentation
</commit_message>
<xml_diff>
--- a/docs/training/develop-with-flutter.pptx
+++ b/docs/training/develop-with-flutter.pptx
@@ -12,8 +12,8 @@
     <p:sldId id="259" r:id="rId6"/>
     <p:sldId id="260" r:id="rId7"/>
     <p:sldId id="261" r:id="rId8"/>
-    <p:sldId id="263" r:id="rId9"/>
-    <p:sldId id="262" r:id="rId10"/>
+    <p:sldId id="262" r:id="rId9"/>
+    <p:sldId id="263" r:id="rId10"/>
   </p:sldIdLst>
   <p:sldSz cx="12192000" cy="6858000"/>
   <p:notesSz cx="6858000" cy="9144000"/>
@@ -112,6 +112,11 @@
       </a:defRPr>
     </a:lvl9pPr>
   </p:defaultTextStyle>
+  <p:extLst>
+    <p:ext uri="{EFAFB233-063F-42B5-8137-9DF3F51BA10A}">
+      <p15:sldGuideLst xmlns:p15="http://schemas.microsoft.com/office/powerpoint/2012/main"/>
+    </p:ext>
+  </p:extLst>
 </p:presentation>
 </file>
 
@@ -4336,15 +4341,27 @@
           </a:p>
           <a:p>
             <a:r>
+              <a:rPr lang="fr-FR" i="1" dirty="0" err="1"/>
+              <a:t>Contains</a:t>
+            </a:r>
+            <a:r>
               <a:rPr lang="fr-FR" i="1" dirty="0"/>
-              <a:t>Contient des comparaisons</a:t>
+              <a:t> </a:t>
+            </a:r>
+            <a:r>
+              <a:rPr lang="fr-FR" i="1" dirty="0" err="1"/>
+              <a:t>comparisons</a:t>
             </a:r>
             <a:br>
               <a:rPr lang="fr-FR" i="1" dirty="0"/>
             </a:br>
             <a:r>
+              <a:rPr lang="fr-FR" i="1" dirty="0" err="1"/>
+              <a:t>with</a:t>
+            </a:r>
+            <a:r>
               <a:rPr lang="fr-FR" i="1" dirty="0"/>
-              <a:t>à </a:t>
+              <a:t> </a:t>
             </a:r>
             <a:r>
               <a:rPr lang="fr-FR" i="1" dirty="0" err="1"/>
@@ -4352,7 +4369,7 @@
             </a:r>
             <a:r>
               <a:rPr lang="fr-FR" i="1" dirty="0"/>
-              <a:t>-Native !</a:t>
+              <a:t>-Native!</a:t>
             </a:r>
           </a:p>
         </p:txBody>
@@ -4472,12 +4489,52 @@
           <a:lstStyle/>
           <a:p>
             <a:r>
+              <a:rPr lang="fr-FR" sz="6000" dirty="0" err="1">
+                <a:solidFill>
+                  <a:schemeClr val="accent1"/>
+                </a:solidFill>
+              </a:rPr>
+              <a:t>Develop</a:t>
+            </a:r>
+            <a:r>
               <a:rPr lang="fr-FR" sz="6000" dirty="0">
                 <a:solidFill>
                   <a:schemeClr val="accent1"/>
                 </a:solidFill>
               </a:rPr>
-              <a:t>Développement avec…</a:t>
+              <a:t> an </a:t>
+            </a:r>
+            <a:r>
+              <a:rPr lang="fr-FR" sz="6000" dirty="0" err="1">
+                <a:solidFill>
+                  <a:schemeClr val="accent1"/>
+                </a:solidFill>
+              </a:rPr>
+              <a:t>app</a:t>
+            </a:r>
+            <a:r>
+              <a:rPr lang="fr-FR" sz="6000" dirty="0">
+                <a:solidFill>
+                  <a:schemeClr val="accent1"/>
+                </a:solidFill>
+              </a:rPr>
+              <a:t> </a:t>
+            </a:r>
+            <a:r>
+              <a:rPr lang="fr-FR" sz="6000" dirty="0" err="1">
+                <a:solidFill>
+                  <a:schemeClr val="accent1"/>
+                </a:solidFill>
+              </a:rPr>
+              <a:t>with</a:t>
+            </a:r>
+            <a:r>
+              <a:rPr lang="fr-FR" sz="6000" dirty="0">
+                <a:solidFill>
+                  <a:schemeClr val="accent1"/>
+                </a:solidFill>
+              </a:rPr>
+              <a:t>…</a:t>
             </a:r>
           </a:p>
         </p:txBody>
@@ -6513,23 +6570,31 @@
         <p:spPr>
           <a:xfrm>
             <a:off x="1143000" y="410598"/>
-            <a:ext cx="9905999" cy="668189"/>
+            <a:ext cx="9905999" cy="1360898"/>
           </a:xfrm>
         </p:spPr>
         <p:txBody>
           <a:bodyPr>
-            <a:normAutofit fontScale="90000"/>
+            <a:normAutofit/>
           </a:bodyPr>
           <a:lstStyle/>
           <a:p>
             <a:pPr algn="ctr"/>
             <a:r>
-              <a:rPr lang="fr-CA" dirty="0" err="1"/>
-              <a:t>Diff</a:t>
-            </a:r>
-            <a:r>
-              <a:rPr lang="fr-CA" dirty="0"/>
-              <a:t>. And frustrations Flutter vs RN</a:t>
+              <a:rPr lang="fr-CA" b="1" dirty="0" err="1"/>
+              <a:t>Other</a:t>
+            </a:r>
+            <a:r>
+              <a:rPr lang="fr-CA" b="1" dirty="0"/>
+              <a:t> </a:t>
+            </a:r>
+            <a:r>
+              <a:rPr lang="fr-CA" b="1" dirty="0" err="1"/>
+              <a:t>subjects</a:t>
+            </a:r>
+            <a:r>
+              <a:rPr lang="fr-CA" b="1" dirty="0"/>
+              <a:t>…</a:t>
             </a:r>
             <a:endParaRPr lang="fr-FR" sz="3600" dirty="0"/>
           </a:p>
@@ -6553,23 +6618,35 @@
         </p:nvSpPr>
         <p:spPr>
           <a:xfrm>
-            <a:off x="1143000" y="1376737"/>
-            <a:ext cx="9905999" cy="4921321"/>
+            <a:off x="1143000" y="1771496"/>
+            <a:ext cx="9905999" cy="4127648"/>
           </a:xfrm>
         </p:spPr>
         <p:txBody>
           <a:bodyPr>
-            <a:normAutofit fontScale="62500" lnSpcReduction="20000"/>
+            <a:normAutofit/>
           </a:bodyPr>
           <a:lstStyle/>
           <a:p>
             <a:r>
-              <a:rPr lang="fr-CA" dirty="0"/>
-              <a:t>Pas de </a:t>
-            </a:r>
-            <a:r>
-              <a:rPr lang="fr-CA" dirty="0" err="1"/>
-              <a:t>Codepush</a:t>
+              <a:rPr lang="fr-CA" dirty="0" err="1"/>
+              <a:t>Example</a:t>
+            </a:r>
+            <a:r>
+              <a:rPr lang="fr-CA" dirty="0"/>
+              <a:t> of lib </a:t>
+            </a:r>
+            <a:r>
+              <a:rPr lang="fr-CA" dirty="0" err="1"/>
+              <a:t>integration</a:t>
+            </a:r>
+            <a:r>
+              <a:rPr lang="fr-CA" dirty="0"/>
+              <a:t> 1:[</a:t>
+            </a:r>
+            <a:r>
+              <a:rPr lang="fr-CA" dirty="0" err="1"/>
+              <a:t>barcode</a:t>
             </a:r>
             <a:r>
               <a:rPr lang="fr-CA" dirty="0"/>
@@ -6577,317 +6654,156 @@
             </a:r>
             <a:r>
               <a:rPr lang="fr-CA" dirty="0" err="1"/>
-              <a:t>c.f</a:t>
-            </a:r>
-            <a:r>
-              <a:rPr lang="fr-CA" dirty="0"/>
-              <a:t>. Discussion </a:t>
-            </a:r>
-            <a:r>
-              <a:rPr lang="fr-CA" u="sng" dirty="0">
-                <a:hlinkClick r:id="rId2"/>
-              </a:rPr>
-              <a:t>https://github.com/flutter/flutter/issues/14330</a:t>
+              <a:t>generator</a:t>
+            </a:r>
+            <a:r>
+              <a:rPr lang="fr-CA" dirty="0"/>
+              <a:t>](</a:t>
+            </a:r>
+            <a:r>
+              <a:rPr lang="fr-CA" u="sng" dirty="0"/>
+              <a:t>https://</a:t>
+            </a:r>
+            <a:r>
+              <a:rPr lang="fr-CA" u="sng" dirty="0" err="1"/>
+              <a:t>pub.dev</a:t>
+            </a:r>
+            <a:r>
+              <a:rPr lang="fr-CA" u="sng" dirty="0"/>
+              <a:t>/packages/</a:t>
+            </a:r>
+            <a:r>
+              <a:rPr lang="fr-CA" u="sng" dirty="0" err="1"/>
+              <a:t>barcode</a:t>
+            </a:r>
+            <a:r>
+              <a:rPr lang="fr-CA" dirty="0"/>
+              <a:t>) to </a:t>
+            </a:r>
+            <a:r>
+              <a:rPr lang="fr-CA" dirty="0" err="1"/>
+              <a:t>create</a:t>
+            </a:r>
+            <a:r>
+              <a:rPr lang="fr-CA" dirty="0"/>
+              <a:t> a </a:t>
+            </a:r>
+            <a:r>
+              <a:rPr lang="fr-CA" dirty="0" err="1"/>
+              <a:t>text</a:t>
+            </a:r>
+            <a:r>
+              <a:rPr lang="fr-CA" dirty="0"/>
+              <a:t> to </a:t>
+            </a:r>
+            <a:r>
+              <a:rPr lang="fr-CA" dirty="0" err="1"/>
+              <a:t>guess</a:t>
+            </a:r>
+            <a:r>
+              <a:rPr lang="fr-CA" dirty="0"/>
+              <a:t> challenge</a:t>
+            </a:r>
+          </a:p>
+          <a:p>
+            <a:r>
+              <a:rPr lang="fr-CA" dirty="0" err="1"/>
+              <a:t>Example</a:t>
+            </a:r>
+            <a:r>
+              <a:rPr lang="fr-CA" dirty="0"/>
+              <a:t> of lib </a:t>
+            </a:r>
+            <a:r>
+              <a:rPr lang="fr-CA" dirty="0" err="1"/>
+              <a:t>integration</a:t>
+            </a:r>
+            <a:r>
+              <a:rPr lang="fr-CA" dirty="0"/>
+              <a:t> 2: [</a:t>
+            </a:r>
+            <a:r>
+              <a:rPr lang="fr-CA" dirty="0" err="1"/>
+              <a:t>barcode</a:t>
+            </a:r>
+            <a:r>
+              <a:rPr lang="fr-CA" dirty="0"/>
+              <a:t> scanner](</a:t>
+            </a:r>
+            <a:r>
+              <a:rPr lang="fr-CA" u="sng" dirty="0"/>
+              <a:t>https://</a:t>
+            </a:r>
+            <a:r>
+              <a:rPr lang="fr-CA" u="sng" dirty="0" err="1"/>
+              <a:t>pub.dev</a:t>
+            </a:r>
+            <a:r>
+              <a:rPr lang="fr-CA" u="sng" dirty="0"/>
+              <a:t>/packages/</a:t>
+            </a:r>
+            <a:r>
+              <a:rPr lang="fr-CA" u="sng" dirty="0" err="1"/>
+              <a:t>flutter_barcode_scanner</a:t>
+            </a:r>
+            <a:r>
+              <a:rPr lang="fr-CA" dirty="0"/>
+              <a:t>) </a:t>
+            </a:r>
+            <a:r>
+              <a:rPr lang="fr-CA" dirty="0" err="1"/>
+              <a:t>feature</a:t>
+            </a:r>
+            <a:r>
+              <a:rPr lang="fr-CA" dirty="0"/>
+              <a:t> to </a:t>
+            </a:r>
+            <a:r>
+              <a:rPr lang="fr-CA" dirty="0" err="1"/>
+              <a:t>accept</a:t>
+            </a:r>
+            <a:r>
+              <a:rPr lang="fr-CA" dirty="0"/>
+              <a:t> (scan) challenge</a:t>
+            </a:r>
+          </a:p>
+          <a:p>
+            <a:r>
+              <a:rPr lang="fr-CA" dirty="0" err="1"/>
+              <a:t>Deep</a:t>
+            </a:r>
+            <a:r>
+              <a:rPr lang="fr-CA" dirty="0"/>
+              <a:t> </a:t>
+            </a:r>
+            <a:r>
+              <a:rPr lang="fr-CA" dirty="0" err="1"/>
+              <a:t>link</a:t>
+            </a:r>
+            <a:r>
+              <a:rPr lang="fr-CA" dirty="0"/>
+              <a:t> navigation for </a:t>
+            </a:r>
+            <a:r>
+              <a:rPr lang="fr-CA" dirty="0" err="1"/>
+              <a:t>both</a:t>
+            </a:r>
+            <a:r>
+              <a:rPr lang="fr-CA" dirty="0"/>
+              <a:t> </a:t>
+            </a:r>
+            <a:r>
+              <a:rPr lang="fr-CA" dirty="0" err="1"/>
+              <a:t>platforms</a:t>
             </a:r>
             <a:endParaRPr lang="fr-CA" dirty="0"/>
-          </a:p>
-          <a:p>
-            <a:r>
-              <a:rPr lang="fr-CA" dirty="0"/>
-              <a:t>Sérialisation JSON pas naturelle comme avec JS en général</a:t>
-            </a:r>
-          </a:p>
-          <a:p>
-            <a:r>
-              <a:rPr lang="fr-CA" dirty="0"/>
-              <a:t>Librairies commencent à être intéressante mais on est à des années lumières de la richesse des librairies JS !</a:t>
-            </a:r>
-          </a:p>
-          <a:p>
-            <a:r>
-              <a:rPr lang="fr-CA" dirty="0"/>
-              <a:t>manque un </a:t>
-            </a:r>
-            <a:r>
-              <a:rPr lang="fr-CA" dirty="0" err="1"/>
-              <a:t>npm</a:t>
-            </a:r>
-            <a:r>
-              <a:rPr lang="fr-CA" dirty="0"/>
-              <a:t> trends 🙂</a:t>
-            </a:r>
-          </a:p>
-          <a:p>
-            <a:r>
-              <a:rPr lang="fr-CA" dirty="0"/>
-              <a:t>Injection des dépendances vs les tests unitaires vs </a:t>
-            </a:r>
-            <a:r>
-              <a:rPr lang="fr-CA" dirty="0" err="1"/>
-              <a:t>mocks</a:t>
-            </a:r>
-            <a:r>
-              <a:rPr lang="fr-CA" dirty="0"/>
-              <a:t> (puissance de </a:t>
-            </a:r>
-            <a:r>
-              <a:rPr lang="fr-CA" dirty="0" err="1"/>
-              <a:t>Jest</a:t>
-            </a:r>
-            <a:r>
-              <a:rPr lang="fr-CA" dirty="0"/>
-              <a:t> non trouvée, même avec </a:t>
-            </a:r>
-            <a:r>
-              <a:rPr lang="fr-CA" dirty="0" err="1"/>
-              <a:t>mockito</a:t>
-            </a:r>
-            <a:r>
-              <a:rPr lang="fr-CA" dirty="0"/>
-              <a:t>)</a:t>
-            </a:r>
-          </a:p>
-          <a:p>
-            <a:r>
-              <a:rPr lang="fr-CA" dirty="0" err="1"/>
-              <a:t>functional</a:t>
-            </a:r>
-            <a:r>
-              <a:rPr lang="fr-CA" dirty="0"/>
-              <a:t> </a:t>
-            </a:r>
-            <a:r>
-              <a:rPr lang="fr-CA" dirty="0" err="1"/>
-              <a:t>programming</a:t>
-            </a:r>
-            <a:r>
-              <a:rPr lang="fr-CA" dirty="0"/>
-              <a:t> all the </a:t>
-            </a:r>
-            <a:r>
-              <a:rPr lang="fr-CA" dirty="0" err="1"/>
-              <a:t>way</a:t>
-            </a:r>
-            <a:r>
-              <a:rPr lang="fr-CA" dirty="0"/>
-              <a:t> vs classes et héritage</a:t>
-            </a:r>
-          </a:p>
-          <a:p>
-            <a:r>
-              <a:rPr lang="fr-CA" dirty="0" err="1"/>
-              <a:t>Material</a:t>
-            </a:r>
-            <a:r>
-              <a:rPr lang="fr-CA" dirty="0"/>
-              <a:t> design est </a:t>
-            </a:r>
-            <a:r>
-              <a:rPr lang="fr-CA" dirty="0" err="1"/>
-              <a:t>built</a:t>
-            </a:r>
-            <a:r>
-              <a:rPr lang="fr-CA" dirty="0"/>
-              <a:t>-in (on peut faire un </a:t>
-            </a:r>
-            <a:r>
-              <a:rPr lang="fr-CA" dirty="0" err="1"/>
-              <a:t>opt</a:t>
-            </a:r>
-            <a:r>
-              <a:rPr lang="fr-CA" dirty="0"/>
-              <a:t>-out, mais pas besoin de librairies comme RN </a:t>
-            </a:r>
-            <a:r>
-              <a:rPr lang="fr-CA" dirty="0" err="1"/>
-              <a:t>paper</a:t>
-            </a:r>
-            <a:r>
-              <a:rPr lang="fr-CA" dirty="0"/>
-              <a:t>)</a:t>
-            </a:r>
-          </a:p>
-          <a:p>
-            <a:r>
-              <a:rPr lang="fr-CA" dirty="0"/>
-              <a:t>nouveaux patterns propres à </a:t>
-            </a:r>
-            <a:r>
-              <a:rPr lang="fr-CA" dirty="0" err="1"/>
-              <a:t>Dart</a:t>
-            </a:r>
-            <a:r>
-              <a:rPr lang="fr-CA" dirty="0"/>
-              <a:t> à apprendre comme </a:t>
-            </a:r>
-            <a:r>
-              <a:rPr lang="fr-CA" dirty="0" err="1"/>
-              <a:t>factory</a:t>
-            </a:r>
-            <a:r>
-              <a:rPr lang="fr-CA" dirty="0"/>
-              <a:t>, part, </a:t>
-            </a:r>
-            <a:r>
-              <a:rPr lang="fr-CA" dirty="0" err="1"/>
-              <a:t>mixin</a:t>
-            </a:r>
-            <a:r>
-              <a:rPr lang="fr-CA" dirty="0"/>
-              <a:t>, extensions, etc.</a:t>
-            </a:r>
-          </a:p>
-          <a:p>
-            <a:r>
-              <a:rPr lang="fr-CA" dirty="0"/>
-              <a:t>Pas besoin de 3rd parties comme </a:t>
-            </a:r>
-            <a:r>
-              <a:rPr lang="fr-CA" dirty="0" err="1"/>
-              <a:t>Detox</a:t>
-            </a:r>
-            <a:r>
-              <a:rPr lang="fr-CA" dirty="0"/>
-              <a:t> pour les e2e</a:t>
-            </a:r>
-          </a:p>
-          <a:p>
-            <a:r>
-              <a:rPr lang="fr-CA" dirty="0"/>
-              <a:t>Pas besoin de 3rd parties (Flipper) pour débugger (</a:t>
-            </a:r>
-            <a:r>
-              <a:rPr lang="fr-CA" dirty="0" err="1"/>
-              <a:t>c.f</a:t>
-            </a:r>
-            <a:r>
-              <a:rPr lang="fr-CA" dirty="0"/>
-              <a:t>. network, etc.) car env. de développement riche et on le sent solide et intégré, même dans </a:t>
-            </a:r>
-            <a:r>
-              <a:rPr lang="fr-CA" dirty="0" err="1"/>
-              <a:t>VSCode</a:t>
-            </a:r>
-            <a:endParaRPr lang="fr-CA" dirty="0"/>
-          </a:p>
-          <a:p>
-            <a:r>
-              <a:rPr lang="fr-CA" dirty="0" err="1"/>
-              <a:t>Tooling</a:t>
-            </a:r>
-            <a:r>
-              <a:rPr lang="fr-CA" dirty="0"/>
-              <a:t> CLI de développement top (flutter cli, </a:t>
-            </a:r>
-            <a:r>
-              <a:rPr lang="fr-CA" dirty="0" err="1"/>
-              <a:t>doctor</a:t>
-            </a:r>
-            <a:r>
-              <a:rPr lang="fr-CA" dirty="0"/>
-              <a:t>, </a:t>
-            </a:r>
-            <a:r>
-              <a:rPr lang="fr-CA" dirty="0" err="1"/>
-              <a:t>run</a:t>
-            </a:r>
-            <a:r>
-              <a:rPr lang="fr-CA" dirty="0"/>
-              <a:t>, tests, etc.)</a:t>
-            </a:r>
-          </a:p>
-          <a:p>
-            <a:r>
-              <a:rPr lang="fr-CA" dirty="0"/>
-              <a:t>lib qui génèrent du code (.</a:t>
-            </a:r>
-            <a:r>
-              <a:rPr lang="fr-CA" dirty="0" err="1"/>
-              <a:t>g.dart</a:t>
-            </a:r>
-            <a:r>
-              <a:rPr lang="fr-CA" dirty="0"/>
-              <a:t>) à partir d'annotations, mais aussi pour d'autres aspects comme le i18n</a:t>
-            </a:r>
-          </a:p>
-          <a:p>
-            <a:r>
-              <a:rPr lang="fr-CA" dirty="0" err="1"/>
-              <a:t>pubspec.yaml</a:t>
-            </a:r>
-            <a:r>
-              <a:rPr lang="fr-CA" dirty="0"/>
-              <a:t> plus "</a:t>
-            </a:r>
-            <a:r>
-              <a:rPr lang="fr-CA" dirty="0" err="1"/>
-              <a:t>platform</a:t>
-            </a:r>
-            <a:r>
-              <a:rPr lang="fr-CA" dirty="0"/>
-              <a:t> </a:t>
-            </a:r>
-            <a:r>
-              <a:rPr lang="fr-CA" dirty="0" err="1"/>
-              <a:t>agnostic</a:t>
-            </a:r>
-            <a:r>
-              <a:rPr lang="fr-CA" dirty="0"/>
-              <a:t> </a:t>
-            </a:r>
-            <a:r>
-              <a:rPr lang="fr-CA" dirty="0" err="1"/>
-              <a:t>approach</a:t>
-            </a:r>
-            <a:r>
-              <a:rPr lang="fr-CA" dirty="0"/>
-              <a:t>", genre Expo, que RN </a:t>
-            </a:r>
-            <a:r>
-              <a:rPr lang="fr-CA" dirty="0" err="1"/>
-              <a:t>barebone</a:t>
-            </a:r>
-            <a:r>
-              <a:rPr lang="fr-CA" dirty="0"/>
-              <a:t> (</a:t>
-            </a:r>
-            <a:r>
-              <a:rPr lang="fr-CA" dirty="0" err="1"/>
-              <a:t>package.json</a:t>
-            </a:r>
-            <a:r>
-              <a:rPr lang="fr-CA" dirty="0"/>
-              <a:t>, </a:t>
-            </a:r>
-            <a:r>
-              <a:rPr lang="fr-CA" dirty="0" err="1"/>
-              <a:t>Info.plist</a:t>
-            </a:r>
-            <a:r>
-              <a:rPr lang="fr-CA" dirty="0"/>
-              <a:t>, </a:t>
-            </a:r>
-            <a:r>
-              <a:rPr lang="fr-CA" dirty="0" err="1"/>
-              <a:t>AndroidManifest.xml</a:t>
-            </a:r>
-            <a:r>
-              <a:rPr lang="fr-CA" dirty="0"/>
-              <a:t>)</a:t>
-            </a:r>
-          </a:p>
-          <a:p>
-            <a:r>
-              <a:rPr lang="fr-CA" dirty="0"/>
-              <a:t>Animations plus faciles ?</a:t>
-            </a:r>
           </a:p>
         </p:txBody>
       </p:sp>
     </p:spTree>
     <p:extLst>
       <p:ext uri="{BB962C8B-B14F-4D97-AF65-F5344CB8AC3E}">
-        <p14:creationId xmlns:p14="http://schemas.microsoft.com/office/powerpoint/2010/main" val="710465562"/>
+        <p14:creationId xmlns:p14="http://schemas.microsoft.com/office/powerpoint/2010/main" val="1885496732"/>
       </p:ext>
     </p:extLst>
   </p:cSld>
@@ -6933,31 +6849,23 @@
         <p:spPr>
           <a:xfrm>
             <a:off x="1143000" y="410598"/>
-            <a:ext cx="9905999" cy="1360898"/>
+            <a:ext cx="9905999" cy="668189"/>
           </a:xfrm>
         </p:spPr>
         <p:txBody>
           <a:bodyPr>
-            <a:normAutofit/>
+            <a:normAutofit fontScale="90000"/>
           </a:bodyPr>
           <a:lstStyle/>
           <a:p>
             <a:pPr algn="ctr"/>
             <a:r>
-              <a:rPr lang="fr-CA" b="1" dirty="0" err="1"/>
-              <a:t>Other</a:t>
-            </a:r>
-            <a:r>
-              <a:rPr lang="fr-CA" b="1" dirty="0"/>
-              <a:t> </a:t>
-            </a:r>
-            <a:r>
-              <a:rPr lang="fr-CA" b="1" dirty="0" err="1"/>
-              <a:t>subjects</a:t>
-            </a:r>
-            <a:r>
-              <a:rPr lang="fr-CA" b="1" dirty="0"/>
-              <a:t>…</a:t>
+              <a:rPr lang="fr-CA" dirty="0" err="1"/>
+              <a:t>Diff</a:t>
+            </a:r>
+            <a:r>
+              <a:rPr lang="fr-CA" dirty="0"/>
+              <a:t>. And frustrations Flutter vs RN</a:t>
             </a:r>
             <a:endParaRPr lang="fr-FR" sz="3600" dirty="0"/>
           </a:p>
@@ -6981,35 +6889,23 @@
         </p:nvSpPr>
         <p:spPr>
           <a:xfrm>
-            <a:off x="1143000" y="1771496"/>
-            <a:ext cx="9905999" cy="4127648"/>
+            <a:off x="1143000" y="1376737"/>
+            <a:ext cx="9905999" cy="4921321"/>
           </a:xfrm>
         </p:spPr>
         <p:txBody>
           <a:bodyPr>
-            <a:normAutofit/>
+            <a:normAutofit fontScale="62500" lnSpcReduction="20000"/>
           </a:bodyPr>
           <a:lstStyle/>
           <a:p>
             <a:r>
-              <a:rPr lang="fr-CA" dirty="0" err="1"/>
-              <a:t>Example</a:t>
-            </a:r>
-            <a:r>
-              <a:rPr lang="fr-CA" dirty="0"/>
-              <a:t> of lib </a:t>
-            </a:r>
-            <a:r>
-              <a:rPr lang="fr-CA" dirty="0" err="1"/>
-              <a:t>integration</a:t>
-            </a:r>
-            <a:r>
-              <a:rPr lang="fr-CA" dirty="0"/>
-              <a:t> 1:[</a:t>
-            </a:r>
-            <a:r>
-              <a:rPr lang="fr-CA" dirty="0" err="1"/>
-              <a:t>barcode</a:t>
+              <a:rPr lang="fr-CA" dirty="0"/>
+              <a:t>Pas de </a:t>
+            </a:r>
+            <a:r>
+              <a:rPr lang="fr-CA" dirty="0" err="1"/>
+              <a:t>Codepush</a:t>
             </a:r>
             <a:r>
               <a:rPr lang="fr-CA" dirty="0"/>
@@ -7017,123 +6913,80 @@
             </a:r>
             <a:r>
               <a:rPr lang="fr-CA" dirty="0" err="1"/>
-              <a:t>generator</a:t>
-            </a:r>
-            <a:r>
-              <a:rPr lang="fr-CA" dirty="0"/>
-              <a:t>](</a:t>
-            </a:r>
-            <a:r>
-              <a:rPr lang="fr-CA" u="sng" dirty="0"/>
-              <a:t>https://</a:t>
-            </a:r>
-            <a:r>
-              <a:rPr lang="fr-CA" u="sng" dirty="0" err="1"/>
-              <a:t>pub.dev</a:t>
-            </a:r>
-            <a:r>
-              <a:rPr lang="fr-CA" u="sng" dirty="0"/>
-              <a:t>/packages/</a:t>
-            </a:r>
-            <a:r>
-              <a:rPr lang="fr-CA" u="sng" dirty="0" err="1"/>
-              <a:t>barcode</a:t>
-            </a:r>
-            <a:r>
-              <a:rPr lang="fr-CA" dirty="0"/>
-              <a:t>) to </a:t>
-            </a:r>
-            <a:r>
-              <a:rPr lang="fr-CA" dirty="0" err="1"/>
-              <a:t>create</a:t>
-            </a:r>
-            <a:r>
-              <a:rPr lang="fr-CA" dirty="0"/>
-              <a:t> a </a:t>
-            </a:r>
-            <a:r>
-              <a:rPr lang="fr-CA" dirty="0" err="1"/>
-              <a:t>text</a:t>
-            </a:r>
-            <a:r>
-              <a:rPr lang="fr-CA" dirty="0"/>
-              <a:t> to </a:t>
-            </a:r>
-            <a:r>
-              <a:rPr lang="fr-CA" dirty="0" err="1"/>
-              <a:t>guess</a:t>
-            </a:r>
-            <a:r>
-              <a:rPr lang="fr-CA" dirty="0"/>
-              <a:t> challenge</a:t>
-            </a:r>
-          </a:p>
-          <a:p>
-            <a:r>
-              <a:rPr lang="fr-CA" dirty="0" err="1"/>
-              <a:t>Example</a:t>
-            </a:r>
-            <a:r>
-              <a:rPr lang="fr-CA" dirty="0"/>
-              <a:t> of lib </a:t>
-            </a:r>
-            <a:r>
-              <a:rPr lang="fr-CA" dirty="0" err="1"/>
-              <a:t>integration</a:t>
-            </a:r>
-            <a:r>
-              <a:rPr lang="fr-CA" dirty="0"/>
-              <a:t> 2: [</a:t>
-            </a:r>
-            <a:r>
-              <a:rPr lang="fr-CA" dirty="0" err="1"/>
-              <a:t>barcode</a:t>
-            </a:r>
-            <a:r>
-              <a:rPr lang="fr-CA" dirty="0"/>
-              <a:t> scanner](</a:t>
-            </a:r>
-            <a:r>
-              <a:rPr lang="fr-CA" u="sng" dirty="0"/>
-              <a:t>https://</a:t>
-            </a:r>
-            <a:r>
-              <a:rPr lang="fr-CA" u="sng" dirty="0" err="1"/>
-              <a:t>pub.dev</a:t>
-            </a:r>
-            <a:r>
-              <a:rPr lang="fr-CA" u="sng" dirty="0"/>
-              <a:t>/packages/</a:t>
-            </a:r>
-            <a:r>
-              <a:rPr lang="fr-CA" u="sng" dirty="0" err="1"/>
-              <a:t>flutter_barcode_scanner</a:t>
-            </a:r>
-            <a:r>
-              <a:rPr lang="fr-CA" dirty="0"/>
-              <a:t>) </a:t>
-            </a:r>
-            <a:r>
-              <a:rPr lang="fr-CA" dirty="0" err="1"/>
-              <a:t>feature</a:t>
-            </a:r>
-            <a:r>
-              <a:rPr lang="fr-CA" dirty="0"/>
-              <a:t> to </a:t>
-            </a:r>
-            <a:r>
-              <a:rPr lang="fr-CA" dirty="0" err="1"/>
-              <a:t>accept</a:t>
-            </a:r>
-            <a:r>
-              <a:rPr lang="fr-CA" dirty="0"/>
-              <a:t> (scan) challenge</a:t>
-            </a:r>
-          </a:p>
-          <a:p>
-            <a:r>
-              <a:rPr lang="fr-CA" dirty="0" err="1"/>
-              <a:t>Deep</a:t>
+              <a:t>c.f</a:t>
+            </a:r>
+            <a:r>
+              <a:rPr lang="fr-CA" dirty="0"/>
+              <a:t>. Discussion </a:t>
+            </a:r>
+            <a:r>
+              <a:rPr lang="fr-CA" u="sng" dirty="0">
+                <a:hlinkClick r:id="rId2"/>
+              </a:rPr>
+              <a:t>https://github.com/flutter/flutter/issues/14330</a:t>
+            </a:r>
+            <a:endParaRPr lang="fr-CA" dirty="0"/>
+          </a:p>
+          <a:p>
+            <a:r>
+              <a:rPr lang="fr-CA" dirty="0"/>
+              <a:t>Sérialisation JSON pas naturelle comme avec JS en général</a:t>
+            </a:r>
+          </a:p>
+          <a:p>
+            <a:r>
+              <a:rPr lang="fr-CA" dirty="0"/>
+              <a:t>Librairies commencent à être intéressante mais on est à des années lumières de la richesse des librairies JS !</a:t>
+            </a:r>
+          </a:p>
+          <a:p>
+            <a:r>
+              <a:rPr lang="fr-CA" dirty="0"/>
+              <a:t>manque un </a:t>
+            </a:r>
+            <a:r>
+              <a:rPr lang="fr-CA" dirty="0" err="1"/>
+              <a:t>npm</a:t>
+            </a:r>
+            <a:r>
+              <a:rPr lang="fr-CA" dirty="0"/>
+              <a:t> trends 🙂</a:t>
+            </a:r>
+          </a:p>
+          <a:p>
+            <a:r>
+              <a:rPr lang="fr-CA" dirty="0"/>
+              <a:t>Injection des dépendances vs les tests unitaires vs </a:t>
+            </a:r>
+            <a:r>
+              <a:rPr lang="fr-CA" dirty="0" err="1"/>
+              <a:t>mocks</a:t>
+            </a:r>
+            <a:r>
+              <a:rPr lang="fr-CA" dirty="0"/>
+              <a:t> (puissance de </a:t>
+            </a:r>
+            <a:r>
+              <a:rPr lang="fr-CA" dirty="0" err="1"/>
+              <a:t>Jest</a:t>
+            </a:r>
+            <a:r>
+              <a:rPr lang="fr-CA" dirty="0"/>
+              <a:t> non trouvée, même avec </a:t>
+            </a:r>
+            <a:r>
+              <a:rPr lang="fr-CA" dirty="0" err="1"/>
+              <a:t>mockito</a:t>
+            </a:r>
+            <a:r>
+              <a:rPr lang="fr-CA" dirty="0"/>
+              <a:t>)</a:t>
+            </a:r>
+          </a:p>
+          <a:p>
+            <a:r>
+              <a:rPr lang="fr-CA" dirty="0" err="1"/>
+              <a:t>functional</a:t>
             </a:r>
             <a:r>
               <a:rPr lang="fr-CA" dirty="0"/>
@@ -7141,15 +6994,170 @@
             </a:r>
             <a:r>
               <a:rPr lang="fr-CA" dirty="0" err="1"/>
-              <a:t>link</a:t>
-            </a:r>
-            <a:r>
-              <a:rPr lang="fr-CA" dirty="0"/>
-              <a:t> navigation for </a:t>
-            </a:r>
-            <a:r>
-              <a:rPr lang="fr-CA" dirty="0" err="1"/>
-              <a:t>both</a:t>
+              <a:t>programming</a:t>
+            </a:r>
+            <a:r>
+              <a:rPr lang="fr-CA" dirty="0"/>
+              <a:t> all the </a:t>
+            </a:r>
+            <a:r>
+              <a:rPr lang="fr-CA" dirty="0" err="1"/>
+              <a:t>way</a:t>
+            </a:r>
+            <a:r>
+              <a:rPr lang="fr-CA" dirty="0"/>
+              <a:t> vs classes et héritage</a:t>
+            </a:r>
+          </a:p>
+          <a:p>
+            <a:r>
+              <a:rPr lang="fr-CA" dirty="0" err="1"/>
+              <a:t>Material</a:t>
+            </a:r>
+            <a:r>
+              <a:rPr lang="fr-CA" dirty="0"/>
+              <a:t> design est </a:t>
+            </a:r>
+            <a:r>
+              <a:rPr lang="fr-CA" dirty="0" err="1"/>
+              <a:t>built</a:t>
+            </a:r>
+            <a:r>
+              <a:rPr lang="fr-CA" dirty="0"/>
+              <a:t>-in (on peut faire un </a:t>
+            </a:r>
+            <a:r>
+              <a:rPr lang="fr-CA" dirty="0" err="1"/>
+              <a:t>opt</a:t>
+            </a:r>
+            <a:r>
+              <a:rPr lang="fr-CA" dirty="0"/>
+              <a:t>-out, mais pas besoin de librairies comme RN </a:t>
+            </a:r>
+            <a:r>
+              <a:rPr lang="fr-CA" dirty="0" err="1"/>
+              <a:t>paper</a:t>
+            </a:r>
+            <a:r>
+              <a:rPr lang="fr-CA" dirty="0"/>
+              <a:t>)</a:t>
+            </a:r>
+          </a:p>
+          <a:p>
+            <a:r>
+              <a:rPr lang="fr-CA" dirty="0"/>
+              <a:t>nouveaux patterns propres à </a:t>
+            </a:r>
+            <a:r>
+              <a:rPr lang="fr-CA" dirty="0" err="1"/>
+              <a:t>Dart</a:t>
+            </a:r>
+            <a:r>
+              <a:rPr lang="fr-CA" dirty="0"/>
+              <a:t> à apprendre comme </a:t>
+            </a:r>
+            <a:r>
+              <a:rPr lang="fr-CA" dirty="0" err="1"/>
+              <a:t>factory</a:t>
+            </a:r>
+            <a:r>
+              <a:rPr lang="fr-CA" dirty="0"/>
+              <a:t>, part, </a:t>
+            </a:r>
+            <a:r>
+              <a:rPr lang="fr-CA" dirty="0" err="1"/>
+              <a:t>mixin</a:t>
+            </a:r>
+            <a:r>
+              <a:rPr lang="fr-CA" dirty="0"/>
+              <a:t>, extensions, etc.</a:t>
+            </a:r>
+          </a:p>
+          <a:p>
+            <a:r>
+              <a:rPr lang="fr-CA" dirty="0"/>
+              <a:t>Pas besoin de 3rd parties comme </a:t>
+            </a:r>
+            <a:r>
+              <a:rPr lang="fr-CA" dirty="0" err="1"/>
+              <a:t>Detox</a:t>
+            </a:r>
+            <a:r>
+              <a:rPr lang="fr-CA" dirty="0"/>
+              <a:t> pour les e2e</a:t>
+            </a:r>
+          </a:p>
+          <a:p>
+            <a:r>
+              <a:rPr lang="fr-CA" dirty="0"/>
+              <a:t>Pas besoin de 3rd parties (Flipper) pour débugger (</a:t>
+            </a:r>
+            <a:r>
+              <a:rPr lang="fr-CA" dirty="0" err="1"/>
+              <a:t>c.f</a:t>
+            </a:r>
+            <a:r>
+              <a:rPr lang="fr-CA" dirty="0"/>
+              <a:t>. network, etc.) car env. de développement riche et on le sent solide et intégré, même dans </a:t>
+            </a:r>
+            <a:r>
+              <a:rPr lang="fr-CA" dirty="0" err="1"/>
+              <a:t>VSCode</a:t>
+            </a:r>
+            <a:endParaRPr lang="fr-CA" dirty="0"/>
+          </a:p>
+          <a:p>
+            <a:r>
+              <a:rPr lang="fr-CA" dirty="0" err="1"/>
+              <a:t>Tooling</a:t>
+            </a:r>
+            <a:r>
+              <a:rPr lang="fr-CA" dirty="0"/>
+              <a:t> CLI de développement top (flutter cli, </a:t>
+            </a:r>
+            <a:r>
+              <a:rPr lang="fr-CA" dirty="0" err="1"/>
+              <a:t>doctor</a:t>
+            </a:r>
+            <a:r>
+              <a:rPr lang="fr-CA" dirty="0"/>
+              <a:t>, </a:t>
+            </a:r>
+            <a:r>
+              <a:rPr lang="fr-CA" dirty="0" err="1"/>
+              <a:t>run</a:t>
+            </a:r>
+            <a:r>
+              <a:rPr lang="fr-CA" dirty="0"/>
+              <a:t>, tests, etc.)</a:t>
+            </a:r>
+          </a:p>
+          <a:p>
+            <a:r>
+              <a:rPr lang="fr-CA" dirty="0"/>
+              <a:t>lib qui génèrent du code (.</a:t>
+            </a:r>
+            <a:r>
+              <a:rPr lang="fr-CA" dirty="0" err="1"/>
+              <a:t>g.dart</a:t>
+            </a:r>
+            <a:r>
+              <a:rPr lang="fr-CA" dirty="0"/>
+              <a:t>) à partir d'annotations, mais aussi pour d'autres aspects comme le i18n</a:t>
+            </a:r>
+          </a:p>
+          <a:p>
+            <a:r>
+              <a:rPr lang="fr-CA" dirty="0" err="1"/>
+              <a:t>pubspec.yaml</a:t>
+            </a:r>
+            <a:r>
+              <a:rPr lang="fr-CA" dirty="0"/>
+              <a:t> plus "</a:t>
+            </a:r>
+            <a:r>
+              <a:rPr lang="fr-CA" dirty="0" err="1"/>
+              <a:t>platform</a:t>
             </a:r>
             <a:r>
               <a:rPr lang="fr-CA" dirty="0"/>
@@ -7157,16 +7165,65 @@
             </a:r>
             <a:r>
               <a:rPr lang="fr-CA" dirty="0" err="1"/>
-              <a:t>platforms</a:t>
-            </a:r>
-            <a:endParaRPr lang="fr-CA" dirty="0"/>
+              <a:t>agnostic</a:t>
+            </a:r>
+            <a:r>
+              <a:rPr lang="fr-CA" dirty="0"/>
+              <a:t> </a:t>
+            </a:r>
+            <a:r>
+              <a:rPr lang="fr-CA" dirty="0" err="1"/>
+              <a:t>approach</a:t>
+            </a:r>
+            <a:r>
+              <a:rPr lang="fr-CA" dirty="0"/>
+              <a:t>", genre Expo, que RN </a:t>
+            </a:r>
+            <a:r>
+              <a:rPr lang="fr-CA" dirty="0" err="1"/>
+              <a:t>barebone</a:t>
+            </a:r>
+            <a:r>
+              <a:rPr lang="fr-CA" dirty="0"/>
+              <a:t> (</a:t>
+            </a:r>
+            <a:r>
+              <a:rPr lang="fr-CA" dirty="0" err="1"/>
+              <a:t>package.json</a:t>
+            </a:r>
+            <a:r>
+              <a:rPr lang="fr-CA" dirty="0"/>
+              <a:t>, </a:t>
+            </a:r>
+            <a:r>
+              <a:rPr lang="fr-CA" dirty="0" err="1"/>
+              <a:t>Info.plist</a:t>
+            </a:r>
+            <a:r>
+              <a:rPr lang="fr-CA" dirty="0"/>
+              <a:t>, </a:t>
+            </a:r>
+            <a:r>
+              <a:rPr lang="fr-CA" dirty="0" err="1"/>
+              <a:t>AndroidManifest.xml</a:t>
+            </a:r>
+            <a:r>
+              <a:rPr lang="fr-CA" dirty="0"/>
+              <a:t>)</a:t>
+            </a:r>
+          </a:p>
+          <a:p>
+            <a:r>
+              <a:rPr lang="fr-CA" dirty="0"/>
+              <a:t>Animations plus faciles ?</a:t>
+            </a:r>
           </a:p>
         </p:txBody>
       </p:sp>
     </p:spTree>
     <p:extLst>
       <p:ext uri="{BB962C8B-B14F-4D97-AF65-F5344CB8AC3E}">
-        <p14:creationId xmlns:p14="http://schemas.microsoft.com/office/powerpoint/2010/main" val="1885496732"/>
+        <p14:creationId xmlns:p14="http://schemas.microsoft.com/office/powerpoint/2010/main" val="710465562"/>
       </p:ext>
     </p:extLst>
   </p:cSld>

</xml_diff>